<commit_message>
callbacks and timeouts and intervals notes added
</commit_message>
<xml_diff>
--- a/JavaScript Advance/JavaScript Advance.pptx
+++ b/JavaScript Advance/JavaScript Advance.pptx
@@ -113,6 +113,11 @@
       </a:defRPr>
     </a:lvl9pPr>
   </p:defaultTextStyle>
+  <p:extLst>
+    <p:ext uri="{EFAFB233-063F-42B5-8137-9DF3F51BA10A}">
+      <p15:sldGuideLst xmlns:p15="http://schemas.microsoft.com/office/powerpoint/2012/main"/>
+    </p:ext>
+  </p:extLst>
 </p:presentation>
 </file>
 
@@ -838,7 +843,7 @@
           <a:p>
             <a:fld id="{83B3BD11-23D5-410B-BDE1-069FB16E6802}" type="datetimeFigureOut">
               <a:rPr lang="en-US" smtClean="0"/>
-              <a:t>3/24/2023</a:t>
+              <a:t>3/25/2023</a:t>
             </a:fld>
             <a:endParaRPr lang="en-US"/>
           </a:p>
@@ -1089,7 +1094,7 @@
           <a:p>
             <a:fld id="{83B3BD11-23D5-410B-BDE1-069FB16E6802}" type="datetimeFigureOut">
               <a:rPr lang="en-US" smtClean="0"/>
-              <a:t>3/24/2023</a:t>
+              <a:t>3/25/2023</a:t>
             </a:fld>
             <a:endParaRPr lang="en-US"/>
           </a:p>
@@ -1403,7 +1408,7 @@
           <a:p>
             <a:fld id="{83B3BD11-23D5-410B-BDE1-069FB16E6802}" type="datetimeFigureOut">
               <a:rPr lang="en-US" smtClean="0"/>
-              <a:t>3/24/2023</a:t>
+              <a:t>3/25/2023</a:t>
             </a:fld>
             <a:endParaRPr lang="en-US"/>
           </a:p>
@@ -1744,7 +1749,7 @@
           <a:p>
             <a:fld id="{83B3BD11-23D5-410B-BDE1-069FB16E6802}" type="datetimeFigureOut">
               <a:rPr lang="en-US" smtClean="0"/>
-              <a:t>3/24/2023</a:t>
+              <a:t>3/25/2023</a:t>
             </a:fld>
             <a:endParaRPr lang="en-US"/>
           </a:p>
@@ -2058,7 +2063,7 @@
           <a:p>
             <a:fld id="{83B3BD11-23D5-410B-BDE1-069FB16E6802}" type="datetimeFigureOut">
               <a:rPr lang="en-US" smtClean="0"/>
-              <a:t>3/24/2023</a:t>
+              <a:t>3/25/2023</a:t>
             </a:fld>
             <a:endParaRPr lang="en-US"/>
           </a:p>
@@ -2451,7 +2456,7 @@
           <a:p>
             <a:fld id="{83B3BD11-23D5-410B-BDE1-069FB16E6802}" type="datetimeFigureOut">
               <a:rPr lang="en-US" smtClean="0"/>
-              <a:t>3/24/2023</a:t>
+              <a:t>3/25/2023</a:t>
             </a:fld>
             <a:endParaRPr lang="en-US"/>
           </a:p>
@@ -2621,7 +2626,7 @@
           <a:p>
             <a:fld id="{83B3BD11-23D5-410B-BDE1-069FB16E6802}" type="datetimeFigureOut">
               <a:rPr lang="en-US" smtClean="0"/>
-              <a:t>3/24/2023</a:t>
+              <a:t>3/25/2023</a:t>
             </a:fld>
             <a:endParaRPr lang="en-US"/>
           </a:p>
@@ -2801,7 +2806,7 @@
           <a:p>
             <a:fld id="{83B3BD11-23D5-410B-BDE1-069FB16E6802}" type="datetimeFigureOut">
               <a:rPr lang="en-US" smtClean="0"/>
-              <a:t>3/24/2023</a:t>
+              <a:t>3/25/2023</a:t>
             </a:fld>
             <a:endParaRPr lang="en-US"/>
           </a:p>
@@ -2977,7 +2982,7 @@
           <a:p>
             <a:fld id="{83B3BD11-23D5-410B-BDE1-069FB16E6802}" type="datetimeFigureOut">
               <a:rPr lang="en-US" smtClean="0"/>
-              <a:t>3/24/2023</a:t>
+              <a:t>3/25/2023</a:t>
             </a:fld>
             <a:endParaRPr lang="en-US"/>
           </a:p>
@@ -3224,7 +3229,7 @@
           <a:p>
             <a:fld id="{83B3BD11-23D5-410B-BDE1-069FB16E6802}" type="datetimeFigureOut">
               <a:rPr lang="en-US" smtClean="0"/>
-              <a:t>3/24/2023</a:t>
+              <a:t>3/25/2023</a:t>
             </a:fld>
             <a:endParaRPr lang="en-US"/>
           </a:p>
@@ -3456,7 +3461,7 @@
           <a:p>
             <a:fld id="{83B3BD11-23D5-410B-BDE1-069FB16E6802}" type="datetimeFigureOut">
               <a:rPr lang="en-US" smtClean="0"/>
-              <a:t>3/24/2023</a:t>
+              <a:t>3/25/2023</a:t>
             </a:fld>
             <a:endParaRPr lang="en-US"/>
           </a:p>
@@ -3830,7 +3835,7 @@
           <a:p>
             <a:fld id="{83B3BD11-23D5-410B-BDE1-069FB16E6802}" type="datetimeFigureOut">
               <a:rPr lang="en-US" smtClean="0"/>
-              <a:t>3/24/2023</a:t>
+              <a:t>3/25/2023</a:t>
             </a:fld>
             <a:endParaRPr lang="en-US"/>
           </a:p>
@@ -3953,7 +3958,7 @@
           <a:p>
             <a:fld id="{83B3BD11-23D5-410B-BDE1-069FB16E6802}" type="datetimeFigureOut">
               <a:rPr lang="en-US" smtClean="0"/>
-              <a:t>3/24/2023</a:t>
+              <a:t>3/25/2023</a:t>
             </a:fld>
             <a:endParaRPr lang="en-US"/>
           </a:p>
@@ -4048,7 +4053,7 @@
           <a:p>
             <a:fld id="{83B3BD11-23D5-410B-BDE1-069FB16E6802}" type="datetimeFigureOut">
               <a:rPr lang="en-US" smtClean="0"/>
-              <a:t>3/24/2023</a:t>
+              <a:t>3/25/2023</a:t>
             </a:fld>
             <a:endParaRPr lang="en-US"/>
           </a:p>
@@ -4303,7 +4308,7 @@
           <a:p>
             <a:fld id="{83B3BD11-23D5-410B-BDE1-069FB16E6802}" type="datetimeFigureOut">
               <a:rPr lang="en-US" smtClean="0"/>
-              <a:t>3/24/2023</a:t>
+              <a:t>3/25/2023</a:t>
             </a:fld>
             <a:endParaRPr lang="en-US"/>
           </a:p>
@@ -4566,7 +4571,7 @@
           <a:p>
             <a:fld id="{83B3BD11-23D5-410B-BDE1-069FB16E6802}" type="datetimeFigureOut">
               <a:rPr lang="en-US" smtClean="0"/>
-              <a:t>3/24/2023</a:t>
+              <a:t>3/25/2023</a:t>
             </a:fld>
             <a:endParaRPr lang="en-US"/>
           </a:p>
@@ -5309,7 +5314,7 @@
           <a:p>
             <a:fld id="{83B3BD11-23D5-410B-BDE1-069FB16E6802}" type="datetimeFigureOut">
               <a:rPr lang="en-US" smtClean="0"/>
-              <a:t>3/24/2023</a:t>
+              <a:t>3/25/2023</a:t>
             </a:fld>
             <a:endParaRPr lang="en-US"/>
           </a:p>
@@ -5951,11 +5956,7 @@
           <a:p>
             <a:r>
               <a:rPr lang="en-US" dirty="0" smtClean="0"/>
-              <a:t>A generator function is a function that can stop  midway and then continue  from where it stopped, a generator function can pause  he execution to achieve that behavior we use the </a:t>
-            </a:r>
-            <a:r>
-              <a:rPr lang="en-US" smtClean="0"/>
-              <a:t>yield keyword</a:t>
+              <a:t>A generator function is a function that can stop  midway and then continue  from where it stopped, a generator function can pause  he execution to achieve that behavior we use the yield keyword</a:t>
             </a:r>
             <a:endParaRPr lang="en-US" dirty="0"/>
           </a:p>
@@ -6670,8 +6671,31 @@
           <a:p>
             <a:r>
               <a:rPr lang="en-US" dirty="0"/>
-              <a:t>The other use is inheritance, in JavaScript inheritance is supported through the concept of prototypes and is referred to as prototypal inheritance</a:t>
-            </a:r>
+              <a:t>The other use is inheritance, in JavaScript inheritance is supported through the concept of prototypes and is referred to as prototypal </a:t>
+            </a:r>
+            <a:r>
+              <a:rPr lang="en-US" dirty="0" smtClean="0"/>
+              <a:t>inheritance</a:t>
+            </a:r>
+          </a:p>
+          <a:p>
+            <a:endParaRPr lang="en-US" dirty="0"/>
+          </a:p>
+          <a:p>
+            <a:r>
+              <a:rPr lang="en-US" dirty="0"/>
+              <a:t>All JavaScript objects inherit properties and methods from a prototype.</a:t>
+            </a:r>
+          </a:p>
+          <a:p>
+            <a:r>
+              <a:rPr lang="en-US" dirty="0"/>
+              <a:t/>
+            </a:r>
+            <a:br>
+              <a:rPr lang="en-US" dirty="0"/>
+            </a:br>
+            <a:endParaRPr lang="en-US" dirty="0"/>
           </a:p>
           <a:p>
             <a:endParaRPr lang="en-US" dirty="0"/>
@@ -6823,7 +6847,9 @@
         </p:nvSpPr>
         <p:spPr/>
         <p:txBody>
-          <a:bodyPr/>
+          <a:bodyPr>
+            <a:normAutofit fontScale="92500" lnSpcReduction="10000"/>
+          </a:bodyPr>
           <a:lstStyle/>
           <a:p>
             <a:r>
@@ -6865,15 +6891,15 @@
             </a:r>
             <a:r>
               <a:rPr lang="en-US" dirty="0" smtClean="0"/>
-              <a:t> it must implement a method at the key[</a:t>
-            </a:r>
-            <a:r>
-              <a:rPr lang="en-US" dirty="0" err="1"/>
-              <a:t>S</a:t>
+              <a:t> it must implement a method at the </a:t>
+            </a:r>
+            <a:r>
+              <a:rPr lang="en-US" dirty="0" smtClean="0"/>
+              <a:t>key[</a:t>
             </a:r>
             <a:r>
               <a:rPr lang="en-US" dirty="0" err="1" smtClean="0"/>
-              <a:t>ymbol.iterator</a:t>
+              <a:t>Symbol.iterator</a:t>
             </a:r>
             <a:r>
               <a:rPr lang="en-US" dirty="0" smtClean="0"/>
@@ -6905,6 +6931,160 @@
               <a:rPr lang="en-US" dirty="0" smtClean="0"/>
               <a:t>The object must have a next method that returns an object with two properties.</a:t>
             </a:r>
+          </a:p>
+          <a:p>
+            <a:pPr marL="0" lvl="0" indent="0" defTabSz="914400" eaLnBrk="0" fontAlgn="base" hangingPunct="0">
+              <a:spcBef>
+                <a:spcPct val="0"/>
+              </a:spcBef>
+              <a:spcAft>
+                <a:spcPct val="0"/>
+              </a:spcAft>
+              <a:buClrTx/>
+              <a:buSzTx/>
+              <a:buNone/>
+            </a:pPr>
+            <a:endParaRPr lang="en-US" altLang="en-US" dirty="0" smtClean="0">
+              <a:solidFill>
+                <a:srgbClr val="000000"/>
+              </a:solidFill>
+              <a:latin typeface="Verdana" panose="020B0604030504040204" pitchFamily="34" charset="0"/>
+            </a:endParaRPr>
+          </a:p>
+          <a:p>
+            <a:pPr defTabSz="914400" eaLnBrk="0" fontAlgn="base" hangingPunct="0">
+              <a:spcBef>
+                <a:spcPct val="0"/>
+              </a:spcBef>
+              <a:spcAft>
+                <a:spcPct val="0"/>
+              </a:spcAft>
+              <a:buClrTx/>
+              <a:buSzTx/>
+            </a:pPr>
+            <a:r>
+              <a:rPr lang="en-US" altLang="en-US" dirty="0" err="1" smtClean="0">
+                <a:solidFill>
+                  <a:srgbClr val="000000"/>
+                </a:solidFill>
+                <a:latin typeface="Verdana" panose="020B0604030504040204" pitchFamily="34" charset="0"/>
+              </a:rPr>
+              <a:t>Iterable</a:t>
+            </a:r>
+            <a:r>
+              <a:rPr lang="en-US" altLang="en-US" dirty="0" smtClean="0">
+                <a:solidFill>
+                  <a:srgbClr val="000000"/>
+                </a:solidFill>
+                <a:latin typeface="Verdana" panose="020B0604030504040204" pitchFamily="34" charset="0"/>
+              </a:rPr>
+              <a:t> </a:t>
+            </a:r>
+            <a:r>
+              <a:rPr lang="en-US" altLang="en-US" dirty="0">
+                <a:solidFill>
+                  <a:srgbClr val="000000"/>
+                </a:solidFill>
+                <a:latin typeface="Verdana" panose="020B0604030504040204" pitchFamily="34" charset="0"/>
+              </a:rPr>
+              <a:t>objects are objects that can be iterated over with </a:t>
+            </a:r>
+            <a:r>
+              <a:rPr lang="en-US" altLang="en-US" dirty="0" err="1">
+                <a:solidFill>
+                  <a:srgbClr val="DC143C"/>
+                </a:solidFill>
+                <a:latin typeface="Consolas" panose="020B0609020204030204" pitchFamily="49" charset="0"/>
+              </a:rPr>
+              <a:t>for..of</a:t>
+            </a:r>
+            <a:r>
+              <a:rPr lang="en-US" altLang="en-US" dirty="0">
+                <a:solidFill>
+                  <a:srgbClr val="000000"/>
+                </a:solidFill>
+                <a:latin typeface="Verdana" panose="020B0604030504040204" pitchFamily="34" charset="0"/>
+              </a:rPr>
+              <a:t>.</a:t>
+            </a:r>
+            <a:endParaRPr lang="en-US" altLang="en-US" dirty="0">
+              <a:solidFill>
+                <a:schemeClr val="tx1"/>
+              </a:solidFill>
+            </a:endParaRPr>
+          </a:p>
+          <a:p>
+            <a:pPr marL="0" lvl="0" indent="0" defTabSz="914400" eaLnBrk="0" fontAlgn="base" hangingPunct="0">
+              <a:spcBef>
+                <a:spcPct val="0"/>
+              </a:spcBef>
+              <a:spcAft>
+                <a:spcPct val="0"/>
+              </a:spcAft>
+              <a:buClrTx/>
+              <a:buSzTx/>
+              <a:buNone/>
+            </a:pPr>
+            <a:r>
+              <a:rPr lang="en-US" altLang="en-US" dirty="0">
+                <a:solidFill>
+                  <a:srgbClr val="000000"/>
+                </a:solidFill>
+                <a:latin typeface="Verdana" panose="020B0604030504040204" pitchFamily="34" charset="0"/>
+              </a:rPr>
+              <a:t>Technically, </a:t>
+            </a:r>
+            <a:r>
+              <a:rPr lang="en-US" altLang="en-US" dirty="0" err="1">
+                <a:solidFill>
+                  <a:srgbClr val="000000"/>
+                </a:solidFill>
+                <a:latin typeface="Verdana" panose="020B0604030504040204" pitchFamily="34" charset="0"/>
+              </a:rPr>
+              <a:t>iterables</a:t>
+            </a:r>
+            <a:r>
+              <a:rPr lang="en-US" altLang="en-US" dirty="0">
+                <a:solidFill>
+                  <a:srgbClr val="000000"/>
+                </a:solidFill>
+                <a:latin typeface="Verdana" panose="020B0604030504040204" pitchFamily="34" charset="0"/>
+              </a:rPr>
+              <a:t> must implement the </a:t>
+            </a:r>
+            <a:r>
+              <a:rPr lang="en-US" altLang="en-US" dirty="0" err="1">
+                <a:solidFill>
+                  <a:srgbClr val="DC143C"/>
+                </a:solidFill>
+                <a:latin typeface="Consolas" panose="020B0609020204030204" pitchFamily="49" charset="0"/>
+              </a:rPr>
+              <a:t>Symbol.iterator</a:t>
+            </a:r>
+            <a:r>
+              <a:rPr lang="en-US" altLang="en-US" dirty="0">
+                <a:solidFill>
+                  <a:srgbClr val="000000"/>
+                </a:solidFill>
+                <a:latin typeface="Verdana" panose="020B0604030504040204" pitchFamily="34" charset="0"/>
+              </a:rPr>
+              <a:t> method.</a:t>
+            </a:r>
+            <a:endParaRPr lang="en-US" altLang="en-US" sz="3200" dirty="0">
+              <a:solidFill>
+                <a:schemeClr val="tx1"/>
+              </a:solidFill>
+              <a:latin typeface="Arial" panose="020B0604020202020204" pitchFamily="34" charset="0"/>
+            </a:endParaRPr>
+          </a:p>
+          <a:p>
+            <a:endParaRPr lang="en-US" dirty="0" smtClean="0"/>
+          </a:p>
+          <a:p>
+            <a:endParaRPr lang="en-US" dirty="0" smtClean="0"/>
+          </a:p>
+          <a:p>
+            <a:endParaRPr lang="en-US" dirty="0" smtClean="0"/>
           </a:p>
           <a:p>
             <a:endParaRPr lang="en-US" dirty="0"/>

</xml_diff>